<commit_message>
Update final project due date.
</commit_message>
<xml_diff>
--- a/bishops/cs321/resources/CS321_Lecture_17B.pptx
+++ b/bishops/cs321/resources/CS321_Lecture_17B.pptx
@@ -115,7 +115,7 @@
   </p:defaultTextStyle>
   <p:extLst>
     <p:ext uri="{EFAFB233-063F-42B5-8137-9DF3F51BA10A}">
-      <p15:sldGuideLst xmlns:p15="http://schemas.microsoft.com/office/powerpoint/2012/main" xmlns=""/>
+      <p15:sldGuideLst xmlns="" xmlns:p15="http://schemas.microsoft.com/office/powerpoint/2012/main"/>
     </p:ext>
   </p:extLst>
 </p:presentation>
@@ -126,7 +126,7 @@
   <p:cmAuthor id="1" name="Gregory" initials="G" lastIdx="1" clrIdx="0">
     <p:extLst>
       <p:ext uri="{19B8F6BF-5375-455C-9EA6-DF929625EA0E}">
-        <p15:presenceInfo xmlns:p15="http://schemas.microsoft.com/office/powerpoint/2012/main" xmlns="" userId="Gregory" providerId="None"/>
+        <p15:presenceInfo xmlns="" xmlns:p15="http://schemas.microsoft.com/office/powerpoint/2012/main" userId="Gregory" providerId="None"/>
       </p:ext>
     </p:extLst>
   </p:cmAuthor>
@@ -216,7 +216,7 @@
             <a:fld id="{A6583E9D-07AB-4C6D-BFD0-47E805C6B3D4}" type="datetimeFigureOut">
               <a:rPr lang="en-CA" smtClean="0"/>
               <a:pPr/>
-              <a:t>2024-03-08</a:t>
+              <a:t>2024-03-24</a:t>
             </a:fld>
             <a:endParaRPr lang="en-CA"/>
           </a:p>
@@ -385,7 +385,7 @@
     </p:spTree>
     <p:extLst>
       <p:ext uri="{BB962C8B-B14F-4D97-AF65-F5344CB8AC3E}">
-        <p14:creationId xmlns:p14="http://schemas.microsoft.com/office/powerpoint/2010/main" xmlns="" val="4237529172"/>
+        <p14:creationId xmlns="" xmlns:p14="http://schemas.microsoft.com/office/powerpoint/2010/main" val="4237529172"/>
       </p:ext>
     </p:extLst>
   </p:cSld>
@@ -560,7 +560,7 @@
     </p:spTree>
     <p:extLst>
       <p:ext uri="{BB962C8B-B14F-4D97-AF65-F5344CB8AC3E}">
-        <p14:creationId xmlns:p14="http://schemas.microsoft.com/office/powerpoint/2010/main" xmlns="" val="2340334442"/>
+        <p14:creationId xmlns="" xmlns:p14="http://schemas.microsoft.com/office/powerpoint/2010/main" val="2340334442"/>
       </p:ext>
     </p:extLst>
   </p:cSld>
@@ -764,7 +764,7 @@
     </p:spTree>
     <p:extLst>
       <p:ext uri="{BB962C8B-B14F-4D97-AF65-F5344CB8AC3E}">
-        <p14:creationId xmlns:p14="http://schemas.microsoft.com/office/powerpoint/2010/main" xmlns="" val="1900560834"/>
+        <p14:creationId xmlns="" xmlns:p14="http://schemas.microsoft.com/office/powerpoint/2010/main" val="1900560834"/>
       </p:ext>
     </p:extLst>
   </p:cSld>
@@ -938,7 +938,7 @@
     </p:spTree>
     <p:extLst>
       <p:ext uri="{BB962C8B-B14F-4D97-AF65-F5344CB8AC3E}">
-        <p14:creationId xmlns:p14="http://schemas.microsoft.com/office/powerpoint/2010/main" xmlns="" val="3722958745"/>
+        <p14:creationId xmlns="" xmlns:p14="http://schemas.microsoft.com/office/powerpoint/2010/main" val="3722958745"/>
       </p:ext>
     </p:extLst>
   </p:cSld>
@@ -1174,7 +1174,7 @@
     </p:spTree>
     <p:extLst>
       <p:ext uri="{BB962C8B-B14F-4D97-AF65-F5344CB8AC3E}">
-        <p14:creationId xmlns:p14="http://schemas.microsoft.com/office/powerpoint/2010/main" xmlns="" val="1822376042"/>
+        <p14:creationId xmlns="" xmlns:p14="http://schemas.microsoft.com/office/powerpoint/2010/main" val="1822376042"/>
       </p:ext>
     </p:extLst>
   </p:cSld>
@@ -1424,7 +1424,7 @@
     </p:spTree>
     <p:extLst>
       <p:ext uri="{BB962C8B-B14F-4D97-AF65-F5344CB8AC3E}">
-        <p14:creationId xmlns:p14="http://schemas.microsoft.com/office/powerpoint/2010/main" xmlns="" val="3411672561"/>
+        <p14:creationId xmlns="" xmlns:p14="http://schemas.microsoft.com/office/powerpoint/2010/main" val="3411672561"/>
       </p:ext>
     </p:extLst>
   </p:cSld>
@@ -1660,7 +1660,7 @@
     </p:spTree>
     <p:extLst>
       <p:ext uri="{BB962C8B-B14F-4D97-AF65-F5344CB8AC3E}">
-        <p14:creationId xmlns:p14="http://schemas.microsoft.com/office/powerpoint/2010/main" xmlns="" val="1093008526"/>
+        <p14:creationId xmlns="" xmlns:p14="http://schemas.microsoft.com/office/powerpoint/2010/main" val="1093008526"/>
       </p:ext>
     </p:extLst>
   </p:cSld>
@@ -2031,7 +2031,7 @@
     </p:spTree>
     <p:extLst>
       <p:ext uri="{BB962C8B-B14F-4D97-AF65-F5344CB8AC3E}">
-        <p14:creationId xmlns:p14="http://schemas.microsoft.com/office/powerpoint/2010/main" xmlns="" val="1087924878"/>
+        <p14:creationId xmlns="" xmlns:p14="http://schemas.microsoft.com/office/powerpoint/2010/main" val="1087924878"/>
       </p:ext>
     </p:extLst>
   </p:cSld>
@@ -2153,7 +2153,7 @@
     </p:spTree>
     <p:extLst>
       <p:ext uri="{BB962C8B-B14F-4D97-AF65-F5344CB8AC3E}">
-        <p14:creationId xmlns:p14="http://schemas.microsoft.com/office/powerpoint/2010/main" xmlns="" val="3802387408"/>
+        <p14:creationId xmlns="" xmlns:p14="http://schemas.microsoft.com/office/powerpoint/2010/main" val="3802387408"/>
       </p:ext>
     </p:extLst>
   </p:cSld>
@@ -2252,7 +2252,7 @@
     </p:spTree>
     <p:extLst>
       <p:ext uri="{BB962C8B-B14F-4D97-AF65-F5344CB8AC3E}">
-        <p14:creationId xmlns:p14="http://schemas.microsoft.com/office/powerpoint/2010/main" xmlns="" val="4234091411"/>
+        <p14:creationId xmlns="" xmlns:p14="http://schemas.microsoft.com/office/powerpoint/2010/main" val="4234091411"/>
       </p:ext>
     </p:extLst>
   </p:cSld>
@@ -2533,7 +2533,7 @@
     </p:spTree>
     <p:extLst>
       <p:ext uri="{BB962C8B-B14F-4D97-AF65-F5344CB8AC3E}">
-        <p14:creationId xmlns:p14="http://schemas.microsoft.com/office/powerpoint/2010/main" xmlns="" val="4189422420"/>
+        <p14:creationId xmlns="" xmlns:p14="http://schemas.microsoft.com/office/powerpoint/2010/main" val="4189422420"/>
       </p:ext>
     </p:extLst>
   </p:cSld>
@@ -2790,7 +2790,7 @@
     </p:spTree>
     <p:extLst>
       <p:ext uri="{BB962C8B-B14F-4D97-AF65-F5344CB8AC3E}">
-        <p14:creationId xmlns:p14="http://schemas.microsoft.com/office/powerpoint/2010/main" xmlns="" val="3252977898"/>
+        <p14:creationId xmlns="" xmlns:p14="http://schemas.microsoft.com/office/powerpoint/2010/main" val="3252977898"/>
       </p:ext>
     </p:extLst>
   </p:cSld>
@@ -3059,7 +3059,7 @@
           <a:blip r:embed="rId13" cstate="print">
             <a:extLst>
               <a:ext uri="{28A0092B-C50C-407E-A947-70E740481C1C}">
-                <a14:useLocalDpi xmlns:a14="http://schemas.microsoft.com/office/drawing/2010/main" xmlns="" val="0"/>
+                <a14:useLocalDpi xmlns="" xmlns:a14="http://schemas.microsoft.com/office/drawing/2010/main" val="0"/>
               </a:ext>
             </a:extLst>
           </a:blip>
@@ -3080,7 +3080,7 @@
     </p:spTree>
     <p:extLst>
       <p:ext uri="{BB962C8B-B14F-4D97-AF65-F5344CB8AC3E}">
-        <p14:creationId xmlns:p14="http://schemas.microsoft.com/office/powerpoint/2010/main" xmlns="" val="4230061028"/>
+        <p14:creationId xmlns="" xmlns:p14="http://schemas.microsoft.com/office/powerpoint/2010/main" val="4230061028"/>
       </p:ext>
     </p:extLst>
   </p:cSld>
@@ -3523,7 +3523,7 @@
           <p:cNvPr id="13" name="Picture 8" descr="http://osiris.ubishops.ca/~alussier/images/transparentlogo_bu.png">
             <a:extLst>
               <a:ext uri="{FF2B5EF4-FFF2-40B4-BE49-F238E27FC236}">
-                <a16:creationId xmlns:a16="http://schemas.microsoft.com/office/drawing/2014/main" xmlns="" id="{CCB9A035-2F1C-4B96-A5DB-70B72D6E4AD8}"/>
+                <a16:creationId xmlns="" xmlns:a16="http://schemas.microsoft.com/office/drawing/2014/main" id="{CCB9A035-2F1C-4B96-A5DB-70B72D6E4AD8}"/>
               </a:ext>
             </a:extLst>
           </p:cNvPr>
@@ -3536,7 +3536,7 @@
           <a:blip r:embed="rId3" cstate="print">
             <a:extLst>
               <a:ext uri="{28A0092B-C50C-407E-A947-70E740481C1C}">
-                <a14:useLocalDpi xmlns:a14="http://schemas.microsoft.com/office/drawing/2010/main" xmlns="" val="0"/>
+                <a14:useLocalDpi xmlns="" xmlns:a14="http://schemas.microsoft.com/office/drawing/2010/main" val="0"/>
               </a:ext>
             </a:extLst>
           </a:blip>
@@ -3556,7 +3556,7 @@
           <a:noFill/>
           <a:extLst>
             <a:ext uri="{909E8E84-426E-40DD-AFC4-6F175D3DCCD1}">
-              <a14:hiddenFill xmlns:a14="http://schemas.microsoft.com/office/drawing/2010/main" xmlns="">
+              <a14:hiddenFill xmlns="" xmlns:a14="http://schemas.microsoft.com/office/drawing/2010/main">
                 <a:solidFill>
                   <a:srgbClr val="FFFFFF"/>
                 </a:solidFill>
@@ -3568,7 +3568,7 @@
     </p:spTree>
     <p:extLst>
       <p:ext uri="{BB962C8B-B14F-4D97-AF65-F5344CB8AC3E}">
-        <p14:creationId xmlns:p14="http://schemas.microsoft.com/office/powerpoint/2010/main" xmlns="" val="4177077622"/>
+        <p14:creationId xmlns="" xmlns:p14="http://schemas.microsoft.com/office/powerpoint/2010/main" val="4177077622"/>
       </p:ext>
     </p:extLst>
   </p:cSld>
@@ -3672,7 +3672,7 @@
           <p:cNvPr id="4" name="Content Placeholder 3">
             <a:extLst>
               <a:ext uri="{FF2B5EF4-FFF2-40B4-BE49-F238E27FC236}">
-                <a16:creationId xmlns:a16="http://schemas.microsoft.com/office/drawing/2014/main" xmlns="" id="{6D58AF24-6D41-4D72-AA4C-29F6B807A3E2}"/>
+                <a16:creationId xmlns="" xmlns:a16="http://schemas.microsoft.com/office/drawing/2014/main" id="{6D58AF24-6D41-4D72-AA4C-29F6B807A3E2}"/>
               </a:ext>
             </a:extLst>
           </p:cNvPr>
@@ -3708,7 +3708,7 @@
           <p:cNvPr id="7" name="Picture 4" descr="Semaphtype.gif">
             <a:extLst>
               <a:ext uri="{FF2B5EF4-FFF2-40B4-BE49-F238E27FC236}">
-                <a16:creationId xmlns:a16="http://schemas.microsoft.com/office/drawing/2014/main" xmlns="" id="{807365D7-3A6C-4F12-BDA2-3D798F29D718}"/>
+                <a16:creationId xmlns="" xmlns:a16="http://schemas.microsoft.com/office/drawing/2014/main" id="{807365D7-3A6C-4F12-BDA2-3D798F29D718}"/>
               </a:ext>
             </a:extLst>
           </p:cNvPr>
@@ -3721,7 +3721,7 @@
           <a:blip r:embed="rId2">
             <a:extLst>
               <a:ext uri="{28A0092B-C50C-407E-A947-70E740481C1C}">
-                <a14:useLocalDpi xmlns:a14="http://schemas.microsoft.com/office/drawing/2010/main" xmlns="" val="0"/>
+                <a14:useLocalDpi xmlns="" xmlns:a14="http://schemas.microsoft.com/office/drawing/2010/main" val="0"/>
               </a:ext>
             </a:extLst>
           </a:blip>
@@ -3744,14 +3744,14 @@
           </a:ln>
           <a:extLst>
             <a:ext uri="{909E8E84-426E-40DD-AFC4-6F175D3DCCD1}">
-              <a14:hiddenFill xmlns:a14="http://schemas.microsoft.com/office/drawing/2010/main" xmlns="">
+              <a14:hiddenFill xmlns="" xmlns:a14="http://schemas.microsoft.com/office/drawing/2010/main">
                 <a:solidFill>
                   <a:srgbClr val="FFFFFF"/>
                 </a:solidFill>
               </a14:hiddenFill>
             </a:ext>
             <a:ext uri="{91240B29-F687-4F45-9708-019B960494DF}">
-              <a14:hiddenLine xmlns:a14="http://schemas.microsoft.com/office/drawing/2010/main" xmlns="" w="9525">
+              <a14:hiddenLine xmlns="" xmlns:a14="http://schemas.microsoft.com/office/drawing/2010/main" w="9525">
                 <a:solidFill>
                   <a:srgbClr val="000000"/>
                 </a:solidFill>
@@ -3768,7 +3768,7 @@
           <p:cNvPr id="9" name="TextBox 8">
             <a:extLst>
               <a:ext uri="{FF2B5EF4-FFF2-40B4-BE49-F238E27FC236}">
-                <a16:creationId xmlns:a16="http://schemas.microsoft.com/office/drawing/2014/main" xmlns="" id="{ACA50819-1CF8-49DF-9907-141818CA9FD7}"/>
+                <a16:creationId xmlns="" xmlns:a16="http://schemas.microsoft.com/office/drawing/2014/main" id="{ACA50819-1CF8-49DF-9907-141818CA9FD7}"/>
               </a:ext>
             </a:extLst>
           </p:cNvPr>
@@ -3802,7 +3802,7 @@
     </p:spTree>
     <p:extLst>
       <p:ext uri="{BB962C8B-B14F-4D97-AF65-F5344CB8AC3E}">
-        <p14:creationId xmlns:p14="http://schemas.microsoft.com/office/powerpoint/2010/main" xmlns="" val="1563300936"/>
+        <p14:creationId xmlns="" xmlns:p14="http://schemas.microsoft.com/office/powerpoint/2010/main" val="1563300936"/>
       </p:ext>
     </p:extLst>
   </p:cSld>
@@ -3906,7 +3906,7 @@
           <p:cNvPr id="4" name="Content Placeholder 3">
             <a:extLst>
               <a:ext uri="{FF2B5EF4-FFF2-40B4-BE49-F238E27FC236}">
-                <a16:creationId xmlns:a16="http://schemas.microsoft.com/office/drawing/2014/main" xmlns="" id="{6D58AF24-6D41-4D72-AA4C-29F6B807A3E2}"/>
+                <a16:creationId xmlns="" xmlns:a16="http://schemas.microsoft.com/office/drawing/2014/main" id="{6D58AF24-6D41-4D72-AA4C-29F6B807A3E2}"/>
               </a:ext>
             </a:extLst>
           </p:cNvPr>
@@ -4083,7 +4083,7 @@
     </p:spTree>
     <p:extLst>
       <p:ext uri="{BB962C8B-B14F-4D97-AF65-F5344CB8AC3E}">
-        <p14:creationId xmlns:p14="http://schemas.microsoft.com/office/powerpoint/2010/main" xmlns="" val="2097782105"/>
+        <p14:creationId xmlns="" xmlns:p14="http://schemas.microsoft.com/office/powerpoint/2010/main" val="2097782105"/>
       </p:ext>
     </p:extLst>
   </p:cSld>
@@ -4187,7 +4187,7 @@
           <p:cNvPr id="4" name="Content Placeholder 3">
             <a:extLst>
               <a:ext uri="{FF2B5EF4-FFF2-40B4-BE49-F238E27FC236}">
-                <a16:creationId xmlns:a16="http://schemas.microsoft.com/office/drawing/2014/main" xmlns="" id="{6D58AF24-6D41-4D72-AA4C-29F6B807A3E2}"/>
+                <a16:creationId xmlns="" xmlns:a16="http://schemas.microsoft.com/office/drawing/2014/main" id="{6D58AF24-6D41-4D72-AA4C-29F6B807A3E2}"/>
               </a:ext>
             </a:extLst>
           </p:cNvPr>
@@ -4218,7 +4218,7 @@
           <p:cNvPr id="7" name="Text Box 2">
             <a:extLst>
               <a:ext uri="{FF2B5EF4-FFF2-40B4-BE49-F238E27FC236}">
-                <a16:creationId xmlns:a16="http://schemas.microsoft.com/office/drawing/2014/main" xmlns="" id="{C65D52AC-509E-4E19-BBE3-215D68A33884}"/>
+                <a16:creationId xmlns="" xmlns:a16="http://schemas.microsoft.com/office/drawing/2014/main" id="{C65D52AC-509E-4E19-BBE3-215D68A33884}"/>
               </a:ext>
             </a:extLst>
           </p:cNvPr>
@@ -4241,14 +4241,14 @@
           </a:ln>
           <a:extLst>
             <a:ext uri="{909E8E84-426E-40DD-AFC4-6F175D3DCCD1}">
-              <a14:hiddenFill xmlns:a14="http://schemas.microsoft.com/office/drawing/2010/main" xmlns="">
+              <a14:hiddenFill xmlns="" xmlns:a14="http://schemas.microsoft.com/office/drawing/2010/main">
                 <a:solidFill>
                   <a:srgbClr val="FFFFFF"/>
                 </a:solidFill>
               </a14:hiddenFill>
             </a:ext>
             <a:ext uri="{91240B29-F687-4F45-9708-019B960494DF}">
-              <a14:hiddenLine xmlns:a14="http://schemas.microsoft.com/office/drawing/2010/main" xmlns="" w="19050">
+              <a14:hiddenLine xmlns="" xmlns:a14="http://schemas.microsoft.com/office/drawing/2010/main" w="19050">
                 <a:solidFill>
                   <a:srgbClr val="000000"/>
                 </a:solidFill>
@@ -4563,7 +4563,7 @@
           <p:cNvPr id="8" name="Rectangle 4">
             <a:extLst>
               <a:ext uri="{FF2B5EF4-FFF2-40B4-BE49-F238E27FC236}">
-                <a16:creationId xmlns:a16="http://schemas.microsoft.com/office/drawing/2014/main" xmlns="" id="{6CDEF08D-0686-49F8-BAAA-C87848D6F272}"/>
+                <a16:creationId xmlns="" xmlns:a16="http://schemas.microsoft.com/office/drawing/2014/main" id="{6CDEF08D-0686-49F8-BAAA-C87848D6F272}"/>
               </a:ext>
             </a:extLst>
           </p:cNvPr>
@@ -4590,7 +4590,7 @@
           </a:ln>
           <a:extLst>
             <a:ext uri="{91240B29-F687-4F45-9708-019B960494DF}">
-              <a14:hiddenLine xmlns:a14="http://schemas.microsoft.com/office/drawing/2010/main" xmlns="" w="19050">
+              <a14:hiddenLine xmlns="" xmlns:a14="http://schemas.microsoft.com/office/drawing/2010/main" w="19050">
                 <a:solidFill>
                   <a:srgbClr val="000000"/>
                 </a:solidFill>
@@ -4747,7 +4747,7 @@
     </p:spTree>
     <p:extLst>
       <p:ext uri="{BB962C8B-B14F-4D97-AF65-F5344CB8AC3E}">
-        <p14:creationId xmlns:p14="http://schemas.microsoft.com/office/powerpoint/2010/main" xmlns="" val="2222666788"/>
+        <p14:creationId xmlns="" xmlns:p14="http://schemas.microsoft.com/office/powerpoint/2010/main" val="2222666788"/>
       </p:ext>
     </p:extLst>
   </p:cSld>
@@ -4850,7 +4850,7 @@
           <p:cNvPr id="4" name="Content Placeholder 3">
             <a:extLst>
               <a:ext uri="{FF2B5EF4-FFF2-40B4-BE49-F238E27FC236}">
-                <a16:creationId xmlns:a16="http://schemas.microsoft.com/office/drawing/2014/main" xmlns="" id="{6D58AF24-6D41-4D72-AA4C-29F6B807A3E2}"/>
+                <a16:creationId xmlns="" xmlns:a16="http://schemas.microsoft.com/office/drawing/2014/main" id="{6D58AF24-6D41-4D72-AA4C-29F6B807A3E2}"/>
               </a:ext>
             </a:extLst>
           </p:cNvPr>
@@ -6365,7 +6365,7 @@
     </p:spTree>
     <p:extLst>
       <p:ext uri="{BB962C8B-B14F-4D97-AF65-F5344CB8AC3E}">
-        <p14:creationId xmlns:p14="http://schemas.microsoft.com/office/powerpoint/2010/main" xmlns="" val="703454163"/>
+        <p14:creationId xmlns="" xmlns:p14="http://schemas.microsoft.com/office/powerpoint/2010/main" val="703454163"/>
       </p:ext>
     </p:extLst>
   </p:cSld>
@@ -6468,7 +6468,7 @@
           <p:cNvPr id="4" name="Content Placeholder 3">
             <a:extLst>
               <a:ext uri="{FF2B5EF4-FFF2-40B4-BE49-F238E27FC236}">
-                <a16:creationId xmlns:a16="http://schemas.microsoft.com/office/drawing/2014/main" xmlns="" id="{6D58AF24-6D41-4D72-AA4C-29F6B807A3E2}"/>
+                <a16:creationId xmlns="" xmlns:a16="http://schemas.microsoft.com/office/drawing/2014/main" id="{6D58AF24-6D41-4D72-AA4C-29F6B807A3E2}"/>
               </a:ext>
             </a:extLst>
           </p:cNvPr>
@@ -7983,7 +7983,7 @@
     </p:spTree>
     <p:extLst>
       <p:ext uri="{BB962C8B-B14F-4D97-AF65-F5344CB8AC3E}">
-        <p14:creationId xmlns:p14="http://schemas.microsoft.com/office/powerpoint/2010/main" xmlns="" val="3642369649"/>
+        <p14:creationId xmlns="" xmlns:p14="http://schemas.microsoft.com/office/powerpoint/2010/main" val="3642369649"/>
       </p:ext>
     </p:extLst>
   </p:cSld>
@@ -8087,7 +8087,7 @@
           <p:cNvPr id="4" name="Content Placeholder 3">
             <a:extLst>
               <a:ext uri="{FF2B5EF4-FFF2-40B4-BE49-F238E27FC236}">
-                <a16:creationId xmlns:a16="http://schemas.microsoft.com/office/drawing/2014/main" xmlns="" id="{6D58AF24-6D41-4D72-AA4C-29F6B807A3E2}"/>
+                <a16:creationId xmlns="" xmlns:a16="http://schemas.microsoft.com/office/drawing/2014/main" id="{6D58AF24-6D41-4D72-AA4C-29F6B807A3E2}"/>
               </a:ext>
             </a:extLst>
           </p:cNvPr>
@@ -8168,7 +8168,7 @@
     </p:spTree>
     <p:extLst>
       <p:ext uri="{BB962C8B-B14F-4D97-AF65-F5344CB8AC3E}">
-        <p14:creationId xmlns:p14="http://schemas.microsoft.com/office/powerpoint/2010/main" xmlns="" val="1752993671"/>
+        <p14:creationId xmlns="" xmlns:p14="http://schemas.microsoft.com/office/powerpoint/2010/main" val="1752993671"/>
       </p:ext>
     </p:extLst>
   </p:cSld>
@@ -8467,7 +8467,7 @@
   <a:extraClrSchemeLst/>
   <a:extLst>
     <a:ext uri="{05A4C25C-085E-4340-85A3-A5531E510DB2}">
-      <thm15:themeFamily xmlns:thm15="http://schemas.microsoft.com/office/thememl/2012/main" xmlns="" name="eye_tracker_presentation" id="{00ED1D97-A04B-46A0-BB71-88655A6B057F}" vid="{F36189FA-3966-4852-951E-5734674D1C7B}"/>
+      <thm15:themeFamily xmlns="" xmlns:thm15="http://schemas.microsoft.com/office/thememl/2012/main" name="eye_tracker_presentation" id="{00ED1D97-A04B-46A0-BB71-88655A6B057F}" vid="{F36189FA-3966-4852-951E-5734674D1C7B}"/>
     </a:ext>
   </a:extLst>
 </a:theme>
@@ -8762,7 +8762,7 @@
   <a:extraClrSchemeLst/>
   <a:extLst>
     <a:ext uri="{05A4C25C-085E-4340-85A3-A5531E510DB2}">
-      <thm15:themeFamily xmlns:thm15="http://schemas.microsoft.com/office/thememl/2012/main" xmlns="" name="Office Theme" id="{62F939B6-93AF-4DB8-9C6B-D6C7DFDC589F}" vid="{4A3C46E8-61CC-4603-A589-7422A47A8E4A}"/>
+      <thm15:themeFamily xmlns="" xmlns:thm15="http://schemas.microsoft.com/office/thememl/2012/main" name="Office Theme" id="{62F939B6-93AF-4DB8-9C6B-D6C7DFDC589F}" vid="{4A3C46E8-61CC-4603-A589-7422A47A8E4A}"/>
     </a:ext>
   </a:extLst>
 </a:theme>

</xml_diff>